<commit_message>
Saved mockup containing possibly useful figure(s), installed gems for progress bar and graphs, updated sources.
</commit_message>
<xml_diff>
--- a/docs/Mockups/First Draft/Draft Goals Mockup.pptx
+++ b/docs/Mockups/First Draft/Draft Goals Mockup.pptx
@@ -288,7 +288,7 @@
           <a:p>
             <a:fld id="{ECB3C1DC-EE09-436C-876C-1E4BB35BFE0C}" type="datetimeFigureOut">
               <a:rPr lang="en-US" smtClean="0"/>
-              <a:t>1/18/2014</a:t>
+              <a:t>1/20/2014</a:t>
             </a:fld>
             <a:endParaRPr lang="en-US"/>
           </a:p>
@@ -458,7 +458,7 @@
           <a:p>
             <a:fld id="{ECB3C1DC-EE09-436C-876C-1E4BB35BFE0C}" type="datetimeFigureOut">
               <a:rPr lang="en-US" smtClean="0"/>
-              <a:t>1/18/2014</a:t>
+              <a:t>1/20/2014</a:t>
             </a:fld>
             <a:endParaRPr lang="en-US"/>
           </a:p>
@@ -638,7 +638,7 @@
           <a:p>
             <a:fld id="{ECB3C1DC-EE09-436C-876C-1E4BB35BFE0C}" type="datetimeFigureOut">
               <a:rPr lang="en-US" smtClean="0"/>
-              <a:t>1/18/2014</a:t>
+              <a:t>1/20/2014</a:t>
             </a:fld>
             <a:endParaRPr lang="en-US"/>
           </a:p>
@@ -808,7 +808,7 @@
           <a:p>
             <a:fld id="{ECB3C1DC-EE09-436C-876C-1E4BB35BFE0C}" type="datetimeFigureOut">
               <a:rPr lang="en-US" smtClean="0"/>
-              <a:t>1/18/2014</a:t>
+              <a:t>1/20/2014</a:t>
             </a:fld>
             <a:endParaRPr lang="en-US"/>
           </a:p>
@@ -1054,7 +1054,7 @@
           <a:p>
             <a:fld id="{ECB3C1DC-EE09-436C-876C-1E4BB35BFE0C}" type="datetimeFigureOut">
               <a:rPr lang="en-US" smtClean="0"/>
-              <a:t>1/18/2014</a:t>
+              <a:t>1/20/2014</a:t>
             </a:fld>
             <a:endParaRPr lang="en-US"/>
           </a:p>
@@ -1342,7 +1342,7 @@
           <a:p>
             <a:fld id="{ECB3C1DC-EE09-436C-876C-1E4BB35BFE0C}" type="datetimeFigureOut">
               <a:rPr lang="en-US" smtClean="0"/>
-              <a:t>1/18/2014</a:t>
+              <a:t>1/20/2014</a:t>
             </a:fld>
             <a:endParaRPr lang="en-US"/>
           </a:p>
@@ -1764,7 +1764,7 @@
           <a:p>
             <a:fld id="{ECB3C1DC-EE09-436C-876C-1E4BB35BFE0C}" type="datetimeFigureOut">
               <a:rPr lang="en-US" smtClean="0"/>
-              <a:t>1/18/2014</a:t>
+              <a:t>1/20/2014</a:t>
             </a:fld>
             <a:endParaRPr lang="en-US"/>
           </a:p>
@@ -1882,7 +1882,7 @@
           <a:p>
             <a:fld id="{ECB3C1DC-EE09-436C-876C-1E4BB35BFE0C}" type="datetimeFigureOut">
               <a:rPr lang="en-US" smtClean="0"/>
-              <a:t>1/18/2014</a:t>
+              <a:t>1/20/2014</a:t>
             </a:fld>
             <a:endParaRPr lang="en-US"/>
           </a:p>
@@ -1977,7 +1977,7 @@
           <a:p>
             <a:fld id="{ECB3C1DC-EE09-436C-876C-1E4BB35BFE0C}" type="datetimeFigureOut">
               <a:rPr lang="en-US" smtClean="0"/>
-              <a:t>1/18/2014</a:t>
+              <a:t>1/20/2014</a:t>
             </a:fld>
             <a:endParaRPr lang="en-US"/>
           </a:p>
@@ -2254,7 +2254,7 @@
           <a:p>
             <a:fld id="{ECB3C1DC-EE09-436C-876C-1E4BB35BFE0C}" type="datetimeFigureOut">
               <a:rPr lang="en-US" smtClean="0"/>
-              <a:t>1/18/2014</a:t>
+              <a:t>1/20/2014</a:t>
             </a:fld>
             <a:endParaRPr lang="en-US"/>
           </a:p>
@@ -2507,7 +2507,7 @@
           <a:p>
             <a:fld id="{ECB3C1DC-EE09-436C-876C-1E4BB35BFE0C}" type="datetimeFigureOut">
               <a:rPr lang="en-US" smtClean="0"/>
-              <a:t>1/18/2014</a:t>
+              <a:t>1/20/2014</a:t>
             </a:fld>
             <a:endParaRPr lang="en-US"/>
           </a:p>
@@ -2720,7 +2720,7 @@
           <a:p>
             <a:fld id="{ECB3C1DC-EE09-436C-876C-1E4BB35BFE0C}" type="datetimeFigureOut">
               <a:rPr lang="en-US" smtClean="0"/>
-              <a:t>1/18/2014</a:t>
+              <a:t>1/20/2014</a:t>
             </a:fld>
             <a:endParaRPr lang="en-US"/>
           </a:p>
@@ -3908,7 +3908,7 @@
         </p:nvSpPr>
         <p:spPr>
           <a:xfrm>
-            <a:off x="5257800" y="3257552"/>
+            <a:off x="5257800" y="3252934"/>
             <a:ext cx="2286000" cy="114302"/>
           </a:xfrm>
           <a:prstGeom prst="rect">
@@ -4108,7 +4108,7 @@
         <p:spPr>
           <a:xfrm>
             <a:off x="8153380" y="4198347"/>
-            <a:ext cx="457210" cy="431513"/>
+            <a:ext cx="365760" cy="365760"/>
           </a:xfrm>
           <a:prstGeom prst="mathPlus">
             <a:avLst/>
@@ -4116,25 +4116,22 @@
           <a:gradFill>
             <a:gsLst>
               <a:gs pos="0">
-                <a:srgbClr val="FFC000">
-                  <a:lumMod val="28000"/>
-                  <a:lumOff val="72000"/>
-                </a:srgbClr>
+                <a:schemeClr val="bg1"/>
               </a:gs>
-              <a:gs pos="57000">
-                <a:srgbClr val="FFC000">
-                  <a:lumMod val="100000"/>
-                </a:srgbClr>
+              <a:gs pos="66000">
+                <a:schemeClr val="bg1">
+                  <a:lumMod val="85000"/>
+                </a:schemeClr>
               </a:gs>
               <a:gs pos="100000">
-                <a:srgbClr val="FFC000">
-                  <a:lumMod val="100000"/>
-                </a:srgbClr>
+                <a:schemeClr val="bg1">
+                  <a:lumMod val="85000"/>
+                </a:schemeClr>
               </a:gs>
             </a:gsLst>
             <a:lin ang="10800000" scaled="1"/>
           </a:gradFill>
-          <a:ln w="3175">
+          <a:ln w="6350">
             <a:solidFill>
               <a:schemeClr val="tx1">
                 <a:lumMod val="75000"/>

</xml_diff>